<commit_message>
fix: change ppt of ch12
</commit_message>
<xml_diff>
--- a/ch12/lecture/_12강_강의록_abcdpdf_pdf_ppt로_변환.pptx
+++ b/ch12/lecture/_12강_강의록_abcdpdf_pdf_ppt로_변환.pptx
@@ -204,7 +204,7 @@
           <a:p>
             <a:fld id="{1D8BD707-D9CF-40AE-B4C6-C98DA3205C09}" type="datetimeFigureOut">
               <a:rPr lang="en-US"/>
-              <a:t>4/18/22</a:t>
+              <a:t>4/19/22</a:t>
             </a:fld>
             <a:endParaRPr lang="en-US"/>
           </a:p>
@@ -381,7 +381,7 @@
           <a:p>
             <a:fld id="{1D8BD707-D9CF-40AE-B4C6-C98DA3205C09}" type="datetimeFigureOut">
               <a:rPr lang="en-US"/>
-              <a:t>4/18/22</a:t>
+              <a:t>4/19/22</a:t>
             </a:fld>
             <a:endParaRPr lang="en-US"/>
           </a:p>
@@ -655,7 +655,7 @@
           <a:p>
             <a:fld id="{1D8BD707-D9CF-40AE-B4C6-C98DA3205C09}" type="datetimeFigureOut">
               <a:rPr lang="en-US"/>
-              <a:t>4/18/22</a:t>
+              <a:t>4/19/22</a:t>
             </a:fld>
             <a:endParaRPr lang="en-US"/>
           </a:p>
@@ -803,7 +803,7 @@
           <a:p>
             <a:fld id="{1D8BD707-D9CF-40AE-B4C6-C98DA3205C09}" type="datetimeFigureOut">
               <a:rPr lang="en-US"/>
-              <a:t>4/18/22</a:t>
+              <a:t>4/19/22</a:t>
             </a:fld>
             <a:endParaRPr lang="en-US"/>
           </a:p>
@@ -922,7 +922,7 @@
           <a:p>
             <a:fld id="{1D8BD707-D9CF-40AE-B4C6-C98DA3205C09}" type="datetimeFigureOut">
               <a:rPr lang="en-US"/>
-              <a:t>4/18/22</a:t>
+              <a:t>4/19/22</a:t>
             </a:fld>
             <a:endParaRPr lang="en-US"/>
           </a:p>
@@ -1147,7 +1147,7 @@
           <a:p>
             <a:fld id="{1D8BD707-D9CF-40AE-B4C6-C98DA3205C09}" type="datetimeFigureOut">
               <a:rPr lang="en-US"/>
-              <a:t>4/18/22</a:t>
+              <a:t>4/19/22</a:t>
             </a:fld>
             <a:endParaRPr lang="en-US"/>
           </a:p>
@@ -6571,6 +6571,42 @@
           <a:xfrm>
             <a:off x="6603745" y="2268220"/>
             <a:ext cx="1320165" cy="229743"/>
+          </a:xfrm>
+          <a:prstGeom prst="rect">
+            <a:avLst/>
+          </a:prstGeom>
+        </p:spPr>
+      </p:pic>
+      <p:pic>
+        <p:nvPicPr>
+          <p:cNvPr id="45" name="그림 44" descr="텍스트이(가) 표시된 사진&#10;&#10;자동 생성된 설명">
+            <a:extLst>
+              <a:ext uri="{FF2B5EF4-FFF2-40B4-BE49-F238E27FC236}">
+                <a16:creationId xmlns:a16="http://schemas.microsoft.com/office/drawing/2014/main" id="{A7865200-9B57-D2B1-081A-5C9AAAAB1D67}"/>
+              </a:ext>
+            </a:extLst>
+          </p:cNvPr>
+          <p:cNvPicPr>
+            <a:picLocks noChangeAspect="1"/>
+          </p:cNvPicPr>
+          <p:nvPr/>
+        </p:nvPicPr>
+        <p:blipFill>
+          <a:blip r:embed="rId12">
+            <a:extLst>
+              <a:ext uri="{28A0092B-C50C-407E-A947-70E740481C1C}">
+                <a14:useLocalDpi xmlns:a14="http://schemas.microsoft.com/office/drawing/2010/main" val="0"/>
+              </a:ext>
+            </a:extLst>
+          </a:blip>
+          <a:stretch>
+            <a:fillRect/>
+          </a:stretch>
+        </p:blipFill>
+        <p:spPr>
+          <a:xfrm>
+            <a:off x="606411" y="3666635"/>
+            <a:ext cx="3417710" cy="911389"/>
           </a:xfrm>
           <a:prstGeom prst="rect">
             <a:avLst/>
@@ -10350,7 +10386,7 @@
               </a:rPr>
               <a:t>2</a:t>
             </a:r>
-            <a:endParaRPr sz="1350" baseline="-24691">
+            <a:endParaRPr sz="1350" baseline="-24691" dirty="0">
               <a:latin typeface="Times New Roman"/>
               <a:cs typeface="Times New Roman"/>
             </a:endParaRPr>
@@ -36510,7 +36546,7 @@
         </p:nvGraphicFramePr>
         <p:xfrm>
           <a:off x="383387" y="2858738"/>
-          <a:ext cx="2161540" cy="1242695"/>
+          <a:ext cx="2160269" cy="1242695"/>
         </p:xfrm>
         <a:graphic>
           <a:graphicData uri="http://schemas.openxmlformats.org/drawingml/2006/table">
@@ -38595,7 +38631,7 @@
         </p:nvGraphicFramePr>
         <p:xfrm>
           <a:off x="377291" y="1346302"/>
-          <a:ext cx="3821429" cy="603885"/>
+          <a:ext cx="3821428" cy="603885"/>
         </p:xfrm>
         <a:graphic>
           <a:graphicData uri="http://schemas.openxmlformats.org/drawingml/2006/table">
@@ -39671,7 +39707,7 @@
         </p:nvGraphicFramePr>
         <p:xfrm>
           <a:off x="377291" y="2626716"/>
-          <a:ext cx="5306060" cy="603885"/>
+          <a:ext cx="5306055" cy="797560"/>
         </p:xfrm>
         <a:graphic>
           <a:graphicData uri="http://schemas.openxmlformats.org/drawingml/2006/table">
@@ -40858,7 +40894,7 @@
         </p:nvGraphicFramePr>
         <p:xfrm>
           <a:off x="377291" y="3907181"/>
-          <a:ext cx="4605655" cy="604520"/>
+          <a:ext cx="4607559" cy="957580"/>
         </p:xfrm>
         <a:graphic>
           <a:graphicData uri="http://schemas.openxmlformats.org/drawingml/2006/table">
@@ -51916,6 +51952,122 @@
           </a:p>
         </p:txBody>
       </p:sp>
+      <p:sp>
+        <p:nvSpPr>
+          <p:cNvPr id="35" name="TextBox 34">
+            <a:extLst>
+              <a:ext uri="{FF2B5EF4-FFF2-40B4-BE49-F238E27FC236}">
+                <a16:creationId xmlns:a16="http://schemas.microsoft.com/office/drawing/2014/main" id="{ADA39A13-DD3F-BDF8-7C65-CB593608BB5B}"/>
+              </a:ext>
+            </a:extLst>
+          </p:cNvPr>
+          <p:cNvSpPr txBox="1"/>
+          <p:nvPr/>
+        </p:nvSpPr>
+        <p:spPr>
+          <a:xfrm>
+            <a:off x="4943375" y="2067185"/>
+            <a:ext cx="856325" cy="276999"/>
+          </a:xfrm>
+          <a:prstGeom prst="rect">
+            <a:avLst/>
+          </a:prstGeom>
+          <a:noFill/>
+        </p:spPr>
+        <p:txBody>
+          <a:bodyPr wrap="none" rtlCol="0">
+            <a:spAutoFit/>
+          </a:bodyPr>
+          <a:lstStyle/>
+          <a:p>
+            <a:r>
+              <a:rPr kumimoji="1" lang="ko-Kore-KR" altLang="en-US" sz="1200" dirty="0">
+                <a:solidFill>
+                  <a:srgbClr val="FF0000"/>
+                </a:solidFill>
+                <a:latin typeface="Kakao OTF Regular" panose="020B0600000101010101" pitchFamily="34" charset="-127"/>
+                <a:ea typeface="Kakao OTF Regular" panose="020B0600000101010101" pitchFamily="34" charset="-127"/>
+              </a:rPr>
+              <a:t>선형</a:t>
+            </a:r>
+            <a:r>
+              <a:rPr kumimoji="1" lang="ko-KR" altLang="en-US" sz="1200" dirty="0">
+                <a:solidFill>
+                  <a:srgbClr val="FF0000"/>
+                </a:solidFill>
+                <a:latin typeface="Kakao OTF Regular" panose="020B0600000101010101" pitchFamily="34" charset="-127"/>
+                <a:ea typeface="Kakao OTF Regular" panose="020B0600000101010101" pitchFamily="34" charset="-127"/>
+              </a:rPr>
+              <a:t> </a:t>
+            </a:r>
+            <a:r>
+              <a:rPr kumimoji="1" lang="ko-KR" altLang="en-US" sz="1200" dirty="0" err="1">
+                <a:solidFill>
+                  <a:srgbClr val="FF0000"/>
+                </a:solidFill>
+                <a:latin typeface="Kakao OTF Regular" panose="020B0600000101010101" pitchFamily="34" charset="-127"/>
+                <a:ea typeface="Kakao OTF Regular" panose="020B0600000101010101" pitchFamily="34" charset="-127"/>
+              </a:rPr>
+              <a:t>예측자</a:t>
+            </a:r>
+            <a:endParaRPr kumimoji="1" lang="ko-Kore-KR" altLang="en-US" sz="1200" dirty="0">
+              <a:solidFill>
+                <a:srgbClr val="FF0000"/>
+              </a:solidFill>
+              <a:latin typeface="Kakao OTF Regular" panose="020B0600000101010101" pitchFamily="34" charset="-127"/>
+              <a:ea typeface="Kakao OTF Regular" panose="020B0600000101010101" pitchFamily="34" charset="-127"/>
+            </a:endParaRPr>
+          </a:p>
+        </p:txBody>
+      </p:sp>
+      <p:sp>
+        <p:nvSpPr>
+          <p:cNvPr id="37" name="TextBox 36">
+            <a:extLst>
+              <a:ext uri="{FF2B5EF4-FFF2-40B4-BE49-F238E27FC236}">
+                <a16:creationId xmlns:a16="http://schemas.microsoft.com/office/drawing/2014/main" id="{F3797FCB-AFF2-C3AF-E275-10AD48B47F21}"/>
+              </a:ext>
+            </a:extLst>
+          </p:cNvPr>
+          <p:cNvSpPr txBox="1"/>
+          <p:nvPr/>
+        </p:nvSpPr>
+        <p:spPr>
+          <a:xfrm>
+            <a:off x="4955050" y="2611615"/>
+            <a:ext cx="729687" cy="276999"/>
+          </a:xfrm>
+          <a:prstGeom prst="rect">
+            <a:avLst/>
+          </a:prstGeom>
+          <a:noFill/>
+        </p:spPr>
+        <p:txBody>
+          <a:bodyPr wrap="none" rtlCol="0">
+            <a:spAutoFit/>
+          </a:bodyPr>
+          <a:lstStyle/>
+          <a:p>
+            <a:r>
+              <a:rPr kumimoji="1" lang="ko-KR" altLang="en-US" sz="1200" dirty="0">
+                <a:solidFill>
+                  <a:srgbClr val="FF0000"/>
+                </a:solidFill>
+                <a:latin typeface="Kakao OTF Regular" panose="020B0600000101010101" pitchFamily="34" charset="-127"/>
+                <a:ea typeface="Kakao OTF Regular" panose="020B0600000101010101" pitchFamily="34" charset="-127"/>
+              </a:rPr>
+              <a:t>연결 함수</a:t>
+            </a:r>
+            <a:endParaRPr kumimoji="1" lang="ko-Kore-KR" altLang="en-US" sz="1200" dirty="0">
+              <a:solidFill>
+                <a:srgbClr val="FF0000"/>
+              </a:solidFill>
+              <a:latin typeface="Kakao OTF Regular" panose="020B0600000101010101" pitchFamily="34" charset="-127"/>
+              <a:ea typeface="Kakao OTF Regular" panose="020B0600000101010101" pitchFamily="34" charset="-127"/>
+            </a:endParaRPr>
+          </a:p>
+        </p:txBody>
+      </p:sp>
     </p:spTree>
   </p:cSld>
   <p:clrMapOvr>

</xml_diff>